<commit_message>
update chart slide title
</commit_message>
<xml_diff>
--- a/chris_larson/apache-poi/SampleSS-updated.pptx
+++ b/chris_larson/apache-poi/SampleSS-updated.pptx
@@ -6,7 +6,8 @@
   </p:sldMasterIdLst>
   <p:sldIdLst>
     <p:sldId id="256" r:id="rId2"/>
-    <p:sldId id="257" r:id="rId8"/>
+    <p:sldId id="257" r:id="rId3"/>
+    <p:sldId id="258" r:id="rId9"/>
   </p:sldIdLst>
   <p:sldSz cx="12192000" cy="6858000"/>
   <p:notesSz cx="6858000" cy="9144000"/>
@@ -3155,6 +3156,303 @@
 </file>
 
 <file path=ppt/slides/slide2.xml><?xml version="1.0" encoding="utf-8"?>
+<p:sld xmlns:a="http://schemas.openxmlformats.org/drawingml/2006/main" xmlns:p="http://schemas.openxmlformats.org/presentationml/2006/main" xmlns:r="http://schemas.openxmlformats.org/officeDocument/2006/relationships">
+  <p:cSld>
+    <p:spTree>
+      <p:nvGrpSpPr>
+        <p:cNvPr id="1" name=""/>
+        <p:cNvGrpSpPr/>
+        <p:nvPr/>
+      </p:nvGrpSpPr>
+      <p:grpSpPr>
+        <a:xfrm>
+          <a:off x="0" y="0"/>
+          <a:ext cx="0" cy="0"/>
+          <a:chOff x="0" y="0"/>
+          <a:chExt cx="0" cy="0"/>
+        </a:xfrm>
+      </p:grpSpPr>
+      <p:sp>
+        <p:nvSpPr>
+          <p:cNvPr id="2" name="Title 1">
+            <a:extLst>
+              <a:ext uri="{FF2B5EF4-FFF2-40B4-BE49-F238E27FC236}">
+                <a16:creationId xmlns:a16="http://schemas.microsoft.com/office/drawing/2014/main" id="{83397DDF-BD66-4C16-A8CC-2575CC83B540}"/>
+              </a:ext>
+            </a:extLst>
+          </p:cNvPr>
+          <p:cNvSpPr>
+            <a:spLocks noGrp="1"/>
+          </p:cNvSpPr>
+          <p:nvPr>
+            <p:ph type="title"/>
+          </p:nvPr>
+        </p:nvSpPr>
+        <p:spPr/>
+        <p:txBody>
+          <a:bodyPr/>
+          <a:lstStyle/>
+          <a:p>
+            <a:r>
+              <a:rPr lang="en-US"/>
+              <a:t>Chart Title</a:t>
+            </a:r>
+            <a:endParaRPr lang="en-US"/>
+          </a:p>
+        </p:txBody>
+      </p:sp>
+      <p:graphicFrame>
+        <p:nvGraphicFramePr>
+          <p:cNvPr id="4" name="Table 4">
+            <a:extLst>
+              <a:ext uri="{FF2B5EF4-FFF2-40B4-BE49-F238E27FC236}">
+                <a16:creationId xmlns:a16="http://schemas.microsoft.com/office/drawing/2014/main" id="{87493C5D-7B00-470B-A1DE-2CAE7984A36B}"/>
+              </a:ext>
+            </a:extLst>
+          </p:cNvPr>
+          <p:cNvGraphicFramePr>
+            <a:graphicFrameLocks noGrp="1"/>
+          </p:cNvGraphicFramePr>
+          <p:nvPr>
+            <p:ph idx="1"/>
+          </p:nvPr>
+        </p:nvGraphicFramePr>
+        <p:xfrm>
+          <a:off x="838200" y="1825625"/>
+          <a:ext cx="10515600" cy="1112520"/>
+        </p:xfrm>
+        <a:graphic>
+          <a:graphicData uri="http://schemas.openxmlformats.org/drawingml/2006/table">
+            <a:tbl>
+              <a:tblPr bandRow="1" firstRow="1">
+                <a:tableStyleId>{5C22544A-7EE6-4342-B048-85BDC9FD1C3A}</a:tableStyleId>
+              </a:tblPr>
+              <a:tblGrid>
+                <a:gridCol w="2103120">
+                  <a:extLst>
+                    <a:ext uri="{9D8B030D-6E8A-4147-A177-3AD203B41FA5}">
+                      <a16:colId xmlns:a16="http://schemas.microsoft.com/office/drawing/2014/main" val="1054458835"/>
+                    </a:ext>
+                  </a:extLst>
+                </a:gridCol>
+                <a:gridCol w="2103120">
+                  <a:extLst>
+                    <a:ext uri="{9D8B030D-6E8A-4147-A177-3AD203B41FA5}">
+                      <a16:colId xmlns:a16="http://schemas.microsoft.com/office/drawing/2014/main" val="3954008991"/>
+                    </a:ext>
+                  </a:extLst>
+                </a:gridCol>
+                <a:gridCol w="2103120">
+                  <a:extLst>
+                    <a:ext uri="{9D8B030D-6E8A-4147-A177-3AD203B41FA5}">
+                      <a16:colId xmlns:a16="http://schemas.microsoft.com/office/drawing/2014/main" val="862938651"/>
+                    </a:ext>
+                  </a:extLst>
+                </a:gridCol>
+                <a:gridCol w="2103120">
+                  <a:extLst>
+                    <a:ext uri="{9D8B030D-6E8A-4147-A177-3AD203B41FA5}">
+                      <a16:colId xmlns:a16="http://schemas.microsoft.com/office/drawing/2014/main" val="2208383260"/>
+                    </a:ext>
+                  </a:extLst>
+                </a:gridCol>
+                <a:gridCol w="2103120">
+                  <a:extLst>
+                    <a:ext uri="{9D8B030D-6E8A-4147-A177-3AD203B41FA5}">
+                      <a16:colId xmlns:a16="http://schemas.microsoft.com/office/drawing/2014/main" val="2357091025"/>
+                    </a:ext>
+                  </a:extLst>
+                </a:gridCol>
+              </a:tblGrid>
+              <a:tr h="370840">
+                <a:tc>
+                  <a:txBody>
+                    <a:bodyPr/>
+                    <a:lstStyle/>
+                    <a:p>
+                      <a:endParaRPr lang="en-US"/>
+                    </a:p>
+                  </a:txBody>
+                  <a:tcPr/>
+                </a:tc>
+                <a:tc>
+                  <a:txBody>
+                    <a:bodyPr/>
+                    <a:lstStyle/>
+                    <a:p>
+                      <a:endParaRPr lang="en-US"/>
+                    </a:p>
+                  </a:txBody>
+                  <a:tcPr/>
+                </a:tc>
+                <a:tc>
+                  <a:txBody>
+                    <a:bodyPr/>
+                    <a:lstStyle/>
+                    <a:p>
+                      <a:endParaRPr lang="en-US"/>
+                    </a:p>
+                  </a:txBody>
+                  <a:tcPr/>
+                </a:tc>
+                <a:tc>
+                  <a:txBody>
+                    <a:bodyPr/>
+                    <a:lstStyle/>
+                    <a:p>
+                      <a:endParaRPr lang="en-US"/>
+                    </a:p>
+                  </a:txBody>
+                  <a:tcPr/>
+                </a:tc>
+                <a:tc>
+                  <a:txBody>
+                    <a:bodyPr/>
+                    <a:lstStyle/>
+                    <a:p>
+                      <a:endParaRPr lang="en-US"/>
+                    </a:p>
+                  </a:txBody>
+                  <a:tcPr/>
+                </a:tc>
+                <a:extLst>
+                  <a:ext uri="{0D108BD9-81ED-4DB2-BD59-A6C34878D82A}">
+                    <a16:rowId xmlns:a16="http://schemas.microsoft.com/office/drawing/2014/main" val="4271576525"/>
+                  </a:ext>
+                </a:extLst>
+              </a:tr>
+              <a:tr h="370840">
+                <a:tc>
+                  <a:txBody>
+                    <a:bodyPr/>
+                    <a:lstStyle/>
+                    <a:p>
+                      <a:endParaRPr lang="en-US"/>
+                    </a:p>
+                  </a:txBody>
+                  <a:tcPr/>
+                </a:tc>
+                <a:tc>
+                  <a:txBody>
+                    <a:bodyPr/>
+                    <a:lstStyle/>
+                    <a:p>
+                      <a:endParaRPr lang="en-US"/>
+                    </a:p>
+                  </a:txBody>
+                  <a:tcPr/>
+                </a:tc>
+                <a:tc>
+                  <a:txBody>
+                    <a:bodyPr/>
+                    <a:lstStyle/>
+                    <a:p>
+                      <a:endParaRPr lang="en-US"/>
+                    </a:p>
+                  </a:txBody>
+                  <a:tcPr/>
+                </a:tc>
+                <a:tc>
+                  <a:txBody>
+                    <a:bodyPr/>
+                    <a:lstStyle/>
+                    <a:p>
+                      <a:endParaRPr lang="en-US"/>
+                    </a:p>
+                  </a:txBody>
+                  <a:tcPr/>
+                </a:tc>
+                <a:tc>
+                  <a:txBody>
+                    <a:bodyPr/>
+                    <a:lstStyle/>
+                    <a:p>
+                      <a:endParaRPr lang="en-US"/>
+                    </a:p>
+                  </a:txBody>
+                  <a:tcPr/>
+                </a:tc>
+                <a:extLst>
+                  <a:ext uri="{0D108BD9-81ED-4DB2-BD59-A6C34878D82A}">
+                    <a16:rowId xmlns:a16="http://schemas.microsoft.com/office/drawing/2014/main" val="3840477288"/>
+                  </a:ext>
+                </a:extLst>
+              </a:tr>
+              <a:tr h="370840">
+                <a:tc>
+                  <a:txBody>
+                    <a:bodyPr/>
+                    <a:lstStyle/>
+                    <a:p>
+                      <a:endParaRPr lang="en-US"/>
+                    </a:p>
+                  </a:txBody>
+                  <a:tcPr/>
+                </a:tc>
+                <a:tc>
+                  <a:txBody>
+                    <a:bodyPr/>
+                    <a:lstStyle/>
+                    <a:p>
+                      <a:endParaRPr lang="en-US"/>
+                    </a:p>
+                  </a:txBody>
+                  <a:tcPr/>
+                </a:tc>
+                <a:tc>
+                  <a:txBody>
+                    <a:bodyPr/>
+                    <a:lstStyle/>
+                    <a:p>
+                      <a:endParaRPr lang="en-US"/>
+                    </a:p>
+                  </a:txBody>
+                  <a:tcPr/>
+                </a:tc>
+                <a:tc>
+                  <a:txBody>
+                    <a:bodyPr/>
+                    <a:lstStyle/>
+                    <a:p>
+                      <a:endParaRPr lang="en-US"/>
+                    </a:p>
+                  </a:txBody>
+                  <a:tcPr/>
+                </a:tc>
+                <a:tc>
+                  <a:txBody>
+                    <a:bodyPr/>
+                    <a:lstStyle/>
+                    <a:p>
+                      <a:endParaRPr lang="en-US"/>
+                    </a:p>
+                  </a:txBody>
+                  <a:tcPr/>
+                </a:tc>
+                <a:extLst>
+                  <a:ext uri="{0D108BD9-81ED-4DB2-BD59-A6C34878D82A}">
+                    <a16:rowId xmlns:a16="http://schemas.microsoft.com/office/drawing/2014/main" val="1794059906"/>
+                  </a:ext>
+                </a:extLst>
+              </a:tr>
+            </a:tbl>
+          </a:graphicData>
+        </a:graphic>
+      </p:graphicFrame>
+    </p:spTree>
+    <p:extLst>
+      <p:ext uri="{BB962C8B-B14F-4D97-AF65-F5344CB8AC3E}">
+        <p14:creationId xmlns:p14="http://schemas.microsoft.com/office/powerpoint/2010/main" val="4140730481"/>
+      </p:ext>
+    </p:extLst>
+  </p:cSld>
+  <p:clrMapOvr>
+    <a:masterClrMapping/>
+  </p:clrMapOvr>
+</p:sld>
+</file>
+
+<file path=ppt/slides/slide3.xml><?xml version="1.0" encoding="utf-8"?>
 <p:sld xmlns:p="http://schemas.openxmlformats.org/presentationml/2006/main" xmlns:a="http://schemas.openxmlformats.org/drawingml/2006/main">
   <p:cSld>
     <p:spTree>
@@ -3171,6 +3469,51 @@
           <a:chExt cx="0" cy="0"/>
         </a:xfrm>
       </p:grpSpPr>
+      <p:sp xmlns:r="http://schemas.openxmlformats.org/officeDocument/2006/relationships">
+        <p:nvSpPr>
+          <p:cNvPr id="2" name="Title 1"/>
+          <p:cNvSpPr>
+            <a:spLocks noGrp="1"/>
+          </p:cNvSpPr>
+          <p:nvPr>
+            <p:ph type="title"/>
+          </p:nvPr>
+        </p:nvSpPr>
+        <p:spPr/>
+        <p:txBody>
+          <a:bodyPr/>
+          <a:lstStyle/>
+          <a:p>
+            <a:r>
+              <a:rPr lang="en-US"/>
+              <a:t>New Slide Title</a:t>
+            </a:r>
+            <a:endParaRPr lang="en-US"/>
+          </a:p>
+        </p:txBody>
+      </p:sp>
+      <p:sp xmlns:r="http://schemas.openxmlformats.org/officeDocument/2006/relationships">
+        <p:nvSpPr>
+          <p:cNvPr id="3" name="Content Placeholder 2"/>
+          <p:cNvSpPr>
+            <a:spLocks noGrp="1"/>
+          </p:cNvSpPr>
+          <p:nvPr>
+            <p:ph idx="1"/>
+          </p:nvPr>
+        </p:nvSpPr>
+        <p:spPr/>
+        <p:txBody>
+          <a:bodyPr/>
+          <a:lstStyle/>
+          <a:p>
+            <a:r>
+              <a:rPr lang="en-US"/>
+              <a:t>First Paragraph</a:t>
+            </a:r>
+          </a:p>
+        </p:txBody>
+      </p:sp>
     </p:spTree>
   </p:cSld>
   <p:clrMapOvr>

</xml_diff>